<commit_message>
Enable importation of Vue/Vuex in a typescript file
</commit_message>
<xml_diff>
--- a/docs/DataLoader.pptx
+++ b/docs/DataLoader.pptx
@@ -105,7 +105,16 @@
       </a:defRPr>
     </a:lvl9pPr>
   </p:defaultTextStyle>
+  <p:extLst>
+    <p:ext uri="{EFAFB233-063F-42B5-8137-9DF3F51BA10A}">
+      <p15:sldGuideLst xmlns:p15="http://schemas.microsoft.com/office/powerpoint/2012/main"/>
+    </p:ext>
+  </p:extLst>
 </p:presentation>
+</file>
+
+<file path=ppt/revisionInfo.xml><?xml version="1.0" encoding="utf-8"?>
+<p1510:revInfo xmlns:a="http://schemas.openxmlformats.org/drawingml/2006/main" xmlns:r="http://schemas.openxmlformats.org/officeDocument/2006/relationships" xmlns:p1510="http://schemas.microsoft.com/office/powerpoint/2015/10/main"/>
 </file>
 
 <file path=ppt/slideLayouts/slideLayout1.xml><?xml version="1.0" encoding="utf-8"?>
@@ -239,7 +248,7 @@
           <a:p>
             <a:fld id="{DA5E2E5E-2BB3-4862-9978-7D7C3864667F}" type="datetimeFigureOut">
               <a:rPr lang="en-US" smtClean="0"/>
-              <a:t>12/6/2017</a:t>
+              <a:t>12/7/2017</a:t>
             </a:fld>
             <a:endParaRPr lang="en-US"/>
           </a:p>
@@ -409,7 +418,7 @@
           <a:p>
             <a:fld id="{DA5E2E5E-2BB3-4862-9978-7D7C3864667F}" type="datetimeFigureOut">
               <a:rPr lang="en-US" smtClean="0"/>
-              <a:t>12/6/2017</a:t>
+              <a:t>12/7/2017</a:t>
             </a:fld>
             <a:endParaRPr lang="en-US"/>
           </a:p>
@@ -589,7 +598,7 @@
           <a:p>
             <a:fld id="{DA5E2E5E-2BB3-4862-9978-7D7C3864667F}" type="datetimeFigureOut">
               <a:rPr lang="en-US" smtClean="0"/>
-              <a:t>12/6/2017</a:t>
+              <a:t>12/7/2017</a:t>
             </a:fld>
             <a:endParaRPr lang="en-US"/>
           </a:p>
@@ -759,7 +768,7 @@
           <a:p>
             <a:fld id="{DA5E2E5E-2BB3-4862-9978-7D7C3864667F}" type="datetimeFigureOut">
               <a:rPr lang="en-US" smtClean="0"/>
-              <a:t>12/6/2017</a:t>
+              <a:t>12/7/2017</a:t>
             </a:fld>
             <a:endParaRPr lang="en-US"/>
           </a:p>
@@ -1003,7 +1012,7 @@
           <a:p>
             <a:fld id="{DA5E2E5E-2BB3-4862-9978-7D7C3864667F}" type="datetimeFigureOut">
               <a:rPr lang="en-US" smtClean="0"/>
-              <a:t>12/6/2017</a:t>
+              <a:t>12/7/2017</a:t>
             </a:fld>
             <a:endParaRPr lang="en-US"/>
           </a:p>
@@ -1235,7 +1244,7 @@
           <a:p>
             <a:fld id="{DA5E2E5E-2BB3-4862-9978-7D7C3864667F}" type="datetimeFigureOut">
               <a:rPr lang="en-US" smtClean="0"/>
-              <a:t>12/6/2017</a:t>
+              <a:t>12/7/2017</a:t>
             </a:fld>
             <a:endParaRPr lang="en-US"/>
           </a:p>
@@ -1602,7 +1611,7 @@
           <a:p>
             <a:fld id="{DA5E2E5E-2BB3-4862-9978-7D7C3864667F}" type="datetimeFigureOut">
               <a:rPr lang="en-US" smtClean="0"/>
-              <a:t>12/6/2017</a:t>
+              <a:t>12/7/2017</a:t>
             </a:fld>
             <a:endParaRPr lang="en-US"/>
           </a:p>
@@ -1720,7 +1729,7 @@
           <a:p>
             <a:fld id="{DA5E2E5E-2BB3-4862-9978-7D7C3864667F}" type="datetimeFigureOut">
               <a:rPr lang="en-US" smtClean="0"/>
-              <a:t>12/6/2017</a:t>
+              <a:t>12/7/2017</a:t>
             </a:fld>
             <a:endParaRPr lang="en-US"/>
           </a:p>
@@ -1815,7 +1824,7 @@
           <a:p>
             <a:fld id="{DA5E2E5E-2BB3-4862-9978-7D7C3864667F}" type="datetimeFigureOut">
               <a:rPr lang="en-US" smtClean="0"/>
-              <a:t>12/6/2017</a:t>
+              <a:t>12/7/2017</a:t>
             </a:fld>
             <a:endParaRPr lang="en-US"/>
           </a:p>
@@ -2092,7 +2101,7 @@
           <a:p>
             <a:fld id="{DA5E2E5E-2BB3-4862-9978-7D7C3864667F}" type="datetimeFigureOut">
               <a:rPr lang="en-US" smtClean="0"/>
-              <a:t>12/6/2017</a:t>
+              <a:t>12/7/2017</a:t>
             </a:fld>
             <a:endParaRPr lang="en-US"/>
           </a:p>
@@ -2349,7 +2358,7 @@
           <a:p>
             <a:fld id="{DA5E2E5E-2BB3-4862-9978-7D7C3864667F}" type="datetimeFigureOut">
               <a:rPr lang="en-US" smtClean="0"/>
-              <a:t>12/6/2017</a:t>
+              <a:t>12/7/2017</a:t>
             </a:fld>
             <a:endParaRPr lang="en-US"/>
           </a:p>
@@ -2562,7 +2571,7 @@
           <a:p>
             <a:fld id="{DA5E2E5E-2BB3-4862-9978-7D7C3864667F}" type="datetimeFigureOut">
               <a:rPr lang="en-US" smtClean="0"/>
-              <a:t>12/6/2017</a:t>
+              <a:t>12/7/2017</a:t>
             </a:fld>
             <a:endParaRPr lang="en-US"/>
           </a:p>
@@ -3311,8 +3320,8 @@
         </p:nvSpPr>
         <p:spPr>
           <a:xfrm>
-            <a:off x="9320542" y="6103772"/>
-            <a:ext cx="995882" cy="646331"/>
+            <a:off x="8731527" y="6466716"/>
+            <a:ext cx="2173910" cy="369332"/>
           </a:xfrm>
           <a:prstGeom prst="rect">
             <a:avLst/>
@@ -3327,11 +3336,19 @@
           <a:p>
             <a:r>
               <a:rPr lang="en-US" dirty="0" err="1"/>
-              <a:t>Vuex</a:t>
-            </a:r>
-            <a:r>
-              <a:rPr lang="en-US" dirty="0"/>
-              <a:t>. Set URI</a:t>
+              <a:t>Store.commit</a:t>
+            </a:r>
+            <a:r>
+              <a:rPr lang="en-US" dirty="0"/>
+              <a:t>(</a:t>
+            </a:r>
+            <a:r>
+              <a:rPr lang="en-US" dirty="0" err="1"/>
+              <a:t>setUri</a:t>
+            </a:r>
+            <a:r>
+              <a:rPr lang="en-US" dirty="0"/>
+              <a:t>)</a:t>
             </a:r>
           </a:p>
         </p:txBody>
@@ -3476,9 +3493,9 @@
           <p:nvPr/>
         </p:nvCxnSpPr>
         <p:spPr>
-          <a:xfrm>
-            <a:off x="9818483" y="5603971"/>
-            <a:ext cx="0" cy="499801"/>
+          <a:xfrm flipH="1">
+            <a:off x="9818482" y="5603971"/>
+            <a:ext cx="1" cy="862745"/>
           </a:xfrm>
           <a:prstGeom prst="straightConnector1">
             <a:avLst/>
@@ -3516,8 +3533,8 @@
         </p:nvSpPr>
         <p:spPr>
           <a:xfrm>
-            <a:off x="8474044" y="7396681"/>
-            <a:ext cx="2353901" cy="5909310"/>
+            <a:off x="8641532" y="8068126"/>
+            <a:ext cx="2353901" cy="6463308"/>
           </a:xfrm>
           <a:prstGeom prst="rect">
             <a:avLst/>
@@ -3702,6 +3719,19 @@
             <a:r>
               <a:rPr lang="en-US" dirty="0"/>
               <a:t>))</a:t>
+            </a:r>
+          </a:p>
+          <a:p>
+            <a:endParaRPr lang="en-US" dirty="0"/>
+          </a:p>
+          <a:p>
+            <a:r>
+              <a:rPr lang="en-US" dirty="0" err="1"/>
+              <a:t>app.init</a:t>
+            </a:r>
+            <a:r>
+              <a:rPr lang="en-US" dirty="0"/>
+              <a:t>()</a:t>
             </a:r>
           </a:p>
           <a:p>
@@ -3726,9 +3756,9 @@
           <p:nvPr/>
         </p:nvCxnSpPr>
         <p:spPr>
-          <a:xfrm flipH="1">
-            <a:off x="9650995" y="6750103"/>
-            <a:ext cx="167488" cy="646578"/>
+          <a:xfrm>
+            <a:off x="9818482" y="6836048"/>
+            <a:ext cx="1" cy="1232078"/>
           </a:xfrm>
           <a:prstGeom prst="straightConnector1">
             <a:avLst/>

</xml_diff>